<commit_message>
Update the reflection slide
</commit_message>
<xml_diff>
--- a/CS_5002_FinalProject_Slides_QiuyingZhou_ZhiweiZhou.pptx
+++ b/CS_5002_FinalProject_Slides_QiuyingZhou_ZhiweiZhou.pptx
@@ -11363,7 +11363,7 @@
         </p:blipFill>
         <p:spPr>
           <a:xfrm>
-            <a:off x="82194" y="0"/>
+            <a:off x="82194" y="202424"/>
             <a:ext cx="9144000" cy="5143500"/>
           </a:xfrm>
           <a:prstGeom prst="rect">
@@ -11371,82 +11371,103 @@
           </a:prstGeom>
         </p:spPr>
       </p:pic>
-      <p:pic>
-        <p:nvPicPr>
-          <p:cNvPr id="7" name="Image 0" descr="https://assets.mindshow.fun/themes/yellow_repeating_geometric_texture_20220622/Content-title-bg.svg">
+      <p:grpSp>
+        <p:nvGrpSpPr>
+          <p:cNvPr id="13" name="Group 12">
             <a:extLst>
               <a:ext uri="{FF2B5EF4-FFF2-40B4-BE49-F238E27FC236}">
-                <a16:creationId xmlns:a16="http://schemas.microsoft.com/office/drawing/2014/main" id="{2C41D530-449D-749A-F628-E444FE546275}"/>
+                <a16:creationId xmlns:a16="http://schemas.microsoft.com/office/drawing/2014/main" id="{A57E4446-3716-5B63-7875-AEA6900FA28D}"/>
               </a:ext>
             </a:extLst>
           </p:cNvPr>
-          <p:cNvPicPr>
-            <a:picLocks noChangeAspect="1"/>
-          </p:cNvPicPr>
+          <p:cNvGrpSpPr/>
           <p:nvPr/>
-        </p:nvPicPr>
-        <p:blipFill rotWithShape="1">
-          <a:blip r:embed="rId5">
-            <a:extLst>
-              <a:ext uri="{96DAC541-7B7A-43D3-8B79-37D633B846F1}">
-                <asvg:svgBlip xmlns:asvg="http://schemas.microsoft.com/office/drawing/2016/SVG/main" r:embed="rId6"/>
-              </a:ext>
-            </a:extLst>
-          </a:blip>
-          <a:srcRect r="8314" b="28679"/>
-          <a:stretch/>
-        </p:blipFill>
-        <p:spPr>
+        </p:nvGrpSpPr>
+        <p:grpSpPr>
           <a:xfrm>
-            <a:off x="800100" y="983453"/>
+            <a:off x="786245" y="1233384"/>
             <a:ext cx="7747999" cy="715709"/>
+            <a:chOff x="800100" y="1247240"/>
+            <a:chExt cx="7747999" cy="715709"/>
           </a:xfrm>
-          <a:prstGeom prst="roundRect">
-            <a:avLst/>
-          </a:prstGeom>
-        </p:spPr>
-      </p:pic>
-      <p:sp>
-        <p:nvSpPr>
-          <p:cNvPr id="3" name="Text 0"/>
-          <p:cNvSpPr/>
-          <p:nvPr/>
-        </p:nvSpPr>
-        <p:spPr>
-          <a:xfrm>
-            <a:off x="1057275" y="1091275"/>
-            <a:ext cx="7286625" cy="500063"/>
-          </a:xfrm>
-          <a:prstGeom prst="rect">
-            <a:avLst/>
-          </a:prstGeom>
-          <a:noFill/>
-          <a:ln/>
-        </p:spPr>
-        <p:txBody>
-          <a:bodyPr wrap="square" rtlCol="0" anchor="t"/>
-          <a:lstStyle/>
-          <a:p>
-            <a:pPr algn="ctr"/>
-            <a:r>
-              <a:rPr lang="en-US" sz="2400" b="1" dirty="0">
+        </p:grpSpPr>
+        <p:pic>
+          <p:nvPicPr>
+            <p:cNvPr id="7" name="Image 0" descr="https://assets.mindshow.fun/themes/yellow_repeating_geometric_texture_20220622/Content-title-bg.svg">
+              <a:extLst>
+                <a:ext uri="{FF2B5EF4-FFF2-40B4-BE49-F238E27FC236}">
+                  <a16:creationId xmlns:a16="http://schemas.microsoft.com/office/drawing/2014/main" id="{2C41D530-449D-749A-F628-E444FE546275}"/>
+                </a:ext>
+              </a:extLst>
+            </p:cNvPr>
+            <p:cNvPicPr>
+              <a:picLocks noChangeAspect="1"/>
+            </p:cNvPicPr>
+            <p:nvPr/>
+          </p:nvPicPr>
+          <p:blipFill rotWithShape="1">
+            <a:blip r:embed="rId5">
+              <a:extLst>
+                <a:ext uri="{96DAC541-7B7A-43D3-8B79-37D633B846F1}">
+                  <asvg:svgBlip xmlns:asvg="http://schemas.microsoft.com/office/drawing/2016/SVG/main" r:embed="rId6"/>
+                </a:ext>
+              </a:extLst>
+            </a:blip>
+            <a:srcRect r="8314" b="28679"/>
+            <a:stretch/>
+          </p:blipFill>
+          <p:spPr>
+            <a:xfrm>
+              <a:off x="800100" y="1247240"/>
+              <a:ext cx="7747999" cy="715709"/>
+            </a:xfrm>
+            <a:prstGeom prst="roundRect">
+              <a:avLst/>
+            </a:prstGeom>
+          </p:spPr>
+        </p:pic>
+        <p:sp>
+          <p:nvSpPr>
+            <p:cNvPr id="3" name="Text 0"/>
+            <p:cNvSpPr/>
+            <p:nvPr/>
+          </p:nvSpPr>
+          <p:spPr>
+            <a:xfrm>
+              <a:off x="1057275" y="1341206"/>
+              <a:ext cx="7286625" cy="500063"/>
+            </a:xfrm>
+            <a:prstGeom prst="rect">
+              <a:avLst/>
+            </a:prstGeom>
+            <a:noFill/>
+            <a:ln/>
+          </p:spPr>
+          <p:txBody>
+            <a:bodyPr wrap="square" rtlCol="0" anchor="t"/>
+            <a:lstStyle/>
+            <a:p>
+              <a:pPr algn="ctr"/>
+              <a:r>
+                <a:rPr lang="en-US" sz="2400" b="1" dirty="0">
+                  <a:solidFill>
+                    <a:schemeClr val="bg1"/>
+                  </a:solidFill>
+                  <a:latin typeface="Noto Sans SC" pitchFamily="34" charset="0"/>
+                  <a:ea typeface="Noto Sans SC" pitchFamily="34" charset="-122"/>
+                  <a:cs typeface="Noto Sans SC" pitchFamily="34" charset="-120"/>
+                </a:rPr>
+                <a:t>8. Reflections and Future Directions</a:t>
+              </a:r>
+              <a:endParaRPr lang="en-US" sz="2400" dirty="0">
                 <a:solidFill>
                   <a:schemeClr val="bg1"/>
                 </a:solidFill>
-                <a:latin typeface="Noto Sans SC" pitchFamily="34" charset="0"/>
-                <a:ea typeface="Noto Sans SC" pitchFamily="34" charset="-122"/>
-                <a:cs typeface="Noto Sans SC" pitchFamily="34" charset="-120"/>
-              </a:rPr>
-              <a:t>8. Reflections and Future Directions</a:t>
-            </a:r>
-            <a:endParaRPr lang="en-US" sz="2400" dirty="0">
-              <a:solidFill>
-                <a:schemeClr val="bg1"/>
-              </a:solidFill>
-            </a:endParaRPr>
-          </a:p>
-        </p:txBody>
-      </p:sp>
+              </a:endParaRPr>
+            </a:p>
+          </p:txBody>
+        </p:sp>
+      </p:grpSp>
       <p:sp>
         <p:nvSpPr>
           <p:cNvPr id="4" name="Text 1"/>
@@ -11455,7 +11476,7 @@
         </p:nvSpPr>
         <p:spPr>
           <a:xfrm>
-            <a:off x="800100" y="3124200"/>
+            <a:off x="800101" y="3639728"/>
             <a:ext cx="2286000" cy="1166813"/>
           </a:xfrm>
           <a:prstGeom prst="rect">
@@ -11465,18 +11486,16 @@
           <a:ln/>
         </p:spPr>
         <p:txBody>
-          <a:bodyPr wrap="square" rtlCol="0" anchor="t"/>
+          <a:bodyPr wrap="square" rtlCol="0" anchor="b"/>
           <a:lstStyle/>
           <a:p>
-            <a:pPr marL="285750" indent="-285750" algn="l">
+            <a:pPr algn="ctr">
               <a:lnSpc>
-                <a:spcPts val="2400"/>
+                <a:spcPts val="1800"/>
               </a:lnSpc>
-              <a:buFont typeface="Arial" panose="020B0604020202020204" pitchFamily="34" charset="0"/>
-              <a:buChar char="•"/>
             </a:pPr>
             <a:r>
-              <a:rPr lang="en-US" b="0" dirty="0">
+              <a:rPr lang="en-US" sz="1100" b="0" dirty="0">
                 <a:solidFill>
                   <a:srgbClr val="383838"/>
                 </a:solidFill>
@@ -11486,50 +11505,7 @@
               </a:rPr>
               <a:t>Benefits for Project Management and beyond</a:t>
             </a:r>
-            <a:endParaRPr lang="en-US" dirty="0"/>
-          </a:p>
-        </p:txBody>
-      </p:sp>
-      <p:sp>
-        <p:nvSpPr>
-          <p:cNvPr id="5" name="Text 2"/>
-          <p:cNvSpPr/>
-          <p:nvPr/>
-        </p:nvSpPr>
-        <p:spPr>
-          <a:xfrm>
-            <a:off x="3429000" y="3124200"/>
-            <a:ext cx="2286000" cy="452438"/>
-          </a:xfrm>
-          <a:prstGeom prst="rect">
-            <a:avLst/>
-          </a:prstGeom>
-          <a:noFill/>
-          <a:ln/>
-        </p:spPr>
-        <p:txBody>
-          <a:bodyPr wrap="square" rtlCol="0" anchor="t"/>
-          <a:lstStyle/>
-          <a:p>
-            <a:pPr marL="285750" indent="-285750" algn="l">
-              <a:lnSpc>
-                <a:spcPts val="2400"/>
-              </a:lnSpc>
-              <a:buFont typeface="Arial" panose="020B0604020202020204" pitchFamily="34" charset="0"/>
-              <a:buChar char="•"/>
-            </a:pPr>
-            <a:r>
-              <a:rPr lang="en-US" b="0" dirty="0">
-                <a:solidFill>
-                  <a:srgbClr val="383838"/>
-                </a:solidFill>
-                <a:latin typeface="Noto Sans SC" pitchFamily="34" charset="0"/>
-                <a:ea typeface="Noto Sans SC" pitchFamily="34" charset="-122"/>
-                <a:cs typeface="Noto Sans SC" pitchFamily="34" charset="-120"/>
-              </a:rPr>
-              <a:t>Things to improve</a:t>
-            </a:r>
-            <a:endParaRPr lang="en-US" dirty="0"/>
+            <a:endParaRPr lang="en-US" sz="1100" dirty="0"/>
           </a:p>
         </p:txBody>
       </p:sp>
@@ -11541,7 +11517,7 @@
         </p:nvSpPr>
         <p:spPr>
           <a:xfrm>
-            <a:off x="6057900" y="3124200"/>
+            <a:off x="6163917" y="3639728"/>
             <a:ext cx="2286000" cy="1166813"/>
           </a:xfrm>
           <a:prstGeom prst="rect">
@@ -11551,18 +11527,238 @@
           <a:ln/>
         </p:spPr>
         <p:txBody>
-          <a:bodyPr wrap="square" rtlCol="0" anchor="t"/>
+          <a:bodyPr wrap="square" rtlCol="0" anchor="b"/>
           <a:lstStyle/>
           <a:p>
-            <a:pPr marL="285750" indent="-285750" algn="l">
+            <a:pPr algn="ctr">
               <a:lnSpc>
                 <a:spcPts val="2400"/>
               </a:lnSpc>
-              <a:buFont typeface="Arial" panose="020B0604020202020204" pitchFamily="34" charset="0"/>
-              <a:buChar char="•"/>
             </a:pPr>
             <a:r>
-              <a:rPr lang="en-US" b="0" dirty="0">
+              <a:rPr lang="en-US" sz="1100" dirty="0">
+                <a:solidFill>
+                  <a:srgbClr val="383838"/>
+                </a:solidFill>
+                <a:latin typeface="Noto Sans SC" pitchFamily="34" charset="0"/>
+                <a:ea typeface="Noto Sans SC" pitchFamily="34" charset="-122"/>
+              </a:rPr>
+              <a:t>Future Development Directions</a:t>
+            </a:r>
+          </a:p>
+        </p:txBody>
+      </p:sp>
+      <p:sp>
+        <p:nvSpPr>
+          <p:cNvPr id="8" name="Rectangle 7" descr="Handshake">
+            <a:extLst>
+              <a:ext uri="{FF2B5EF4-FFF2-40B4-BE49-F238E27FC236}">
+                <a16:creationId xmlns:a16="http://schemas.microsoft.com/office/drawing/2014/main" id="{57C4EC53-1C77-0844-758B-C6A1034D3656}"/>
+              </a:ext>
+            </a:extLst>
+          </p:cNvPr>
+          <p:cNvSpPr/>
+          <p:nvPr/>
+        </p:nvSpPr>
+        <p:spPr>
+          <a:xfrm>
+            <a:off x="1310395" y="3100345"/>
+            <a:ext cx="1266551" cy="1266551"/>
+          </a:xfrm>
+          <a:prstGeom prst="rect">
+            <a:avLst/>
+          </a:prstGeom>
+          <a:blipFill>
+            <a:blip r:embed="rId7">
+              <a:extLst>
+                <a:ext uri="{28A0092B-C50C-407E-A947-70E740481C1C}">
+                  <a14:useLocalDpi xmlns:a14="http://schemas.microsoft.com/office/drawing/2010/main" val="0"/>
+                </a:ext>
+                <a:ext uri="{96DAC541-7B7A-43D3-8B79-37D633B846F1}">
+                  <asvg:svgBlip xmlns:asvg="http://schemas.microsoft.com/office/drawing/2016/SVG/main" r:embed="rId8"/>
+                </a:ext>
+              </a:extLst>
+            </a:blip>
+            <a:stretch>
+              <a:fillRect/>
+            </a:stretch>
+          </a:blipFill>
+          <a:ln>
+            <a:noFill/>
+          </a:ln>
+        </p:spPr>
+        <p:style>
+          <a:lnRef idx="2">
+            <a:scrgbClr r="0" g="0" b="0"/>
+          </a:lnRef>
+          <a:fillRef idx="1">
+            <a:scrgbClr r="0" g="0" b="0"/>
+          </a:fillRef>
+          <a:effectRef idx="0">
+            <a:schemeClr val="accent1">
+              <a:hueOff val="0"/>
+              <a:satOff val="0"/>
+              <a:lumOff val="0"/>
+              <a:alphaOff val="0"/>
+            </a:schemeClr>
+          </a:effectRef>
+          <a:fontRef idx="minor">
+            <a:schemeClr val="lt1"/>
+          </a:fontRef>
+        </p:style>
+      </p:sp>
+      <p:sp>
+        <p:nvSpPr>
+          <p:cNvPr id="9" name="Rectangle 8" descr="Upward trend">
+            <a:extLst>
+              <a:ext uri="{FF2B5EF4-FFF2-40B4-BE49-F238E27FC236}">
+                <a16:creationId xmlns:a16="http://schemas.microsoft.com/office/drawing/2014/main" id="{E966BD85-A7D1-C6BB-B001-DAF00EAE4B6B}"/>
+              </a:ext>
+            </a:extLst>
+          </p:cNvPr>
+          <p:cNvSpPr/>
+          <p:nvPr/>
+        </p:nvSpPr>
+        <p:spPr>
+          <a:xfrm>
+            <a:off x="3991733" y="3180551"/>
+            <a:ext cx="1266551" cy="1266551"/>
+          </a:xfrm>
+          <a:prstGeom prst="rect">
+            <a:avLst/>
+          </a:prstGeom>
+          <a:blipFill>
+            <a:blip r:embed="rId9">
+              <a:extLst>
+                <a:ext uri="{28A0092B-C50C-407E-A947-70E740481C1C}">
+                  <a14:useLocalDpi xmlns:a14="http://schemas.microsoft.com/office/drawing/2010/main" val="0"/>
+                </a:ext>
+                <a:ext uri="{96DAC541-7B7A-43D3-8B79-37D633B846F1}">
+                  <asvg:svgBlip xmlns:asvg="http://schemas.microsoft.com/office/drawing/2016/SVG/main" r:embed="rId10"/>
+                </a:ext>
+              </a:extLst>
+            </a:blip>
+            <a:stretch>
+              <a:fillRect/>
+            </a:stretch>
+          </a:blipFill>
+          <a:ln>
+            <a:noFill/>
+          </a:ln>
+        </p:spPr>
+        <p:style>
+          <a:lnRef idx="2">
+            <a:scrgbClr r="0" g="0" b="0"/>
+          </a:lnRef>
+          <a:fillRef idx="1">
+            <a:scrgbClr r="0" g="0" b="0"/>
+          </a:fillRef>
+          <a:effectRef idx="0">
+            <a:schemeClr val="accent1">
+              <a:hueOff val="0"/>
+              <a:satOff val="0"/>
+              <a:lumOff val="0"/>
+              <a:alphaOff val="0"/>
+            </a:schemeClr>
+          </a:effectRef>
+          <a:fontRef idx="minor">
+            <a:schemeClr val="lt1"/>
+          </a:fontRef>
+        </p:style>
+      </p:sp>
+      <p:sp>
+        <p:nvSpPr>
+          <p:cNvPr id="11" name="Rectangle 10" descr="Head with Gears">
+            <a:extLst>
+              <a:ext uri="{FF2B5EF4-FFF2-40B4-BE49-F238E27FC236}">
+                <a16:creationId xmlns:a16="http://schemas.microsoft.com/office/drawing/2014/main" id="{D9E1716E-81EE-B9C1-2D7E-81B0471A8B62}"/>
+              </a:ext>
+            </a:extLst>
+          </p:cNvPr>
+          <p:cNvSpPr/>
+          <p:nvPr/>
+        </p:nvSpPr>
+        <p:spPr>
+          <a:xfrm>
+            <a:off x="6819437" y="3326348"/>
+            <a:ext cx="974959" cy="974959"/>
+          </a:xfrm>
+          <a:prstGeom prst="rect">
+            <a:avLst/>
+          </a:prstGeom>
+          <a:blipFill>
+            <a:blip r:embed="rId11">
+              <a:extLst>
+                <a:ext uri="{28A0092B-C50C-407E-A947-70E740481C1C}">
+                  <a14:useLocalDpi xmlns:a14="http://schemas.microsoft.com/office/drawing/2010/main" val="0"/>
+                </a:ext>
+                <a:ext uri="{96DAC541-7B7A-43D3-8B79-37D633B846F1}">
+                  <asvg:svgBlip xmlns:asvg="http://schemas.microsoft.com/office/drawing/2016/SVG/main" r:embed="rId12"/>
+                </a:ext>
+              </a:extLst>
+            </a:blip>
+            <a:stretch>
+              <a:fillRect/>
+            </a:stretch>
+          </a:blipFill>
+          <a:ln>
+            <a:noFill/>
+          </a:ln>
+        </p:spPr>
+        <p:style>
+          <a:lnRef idx="2">
+            <a:scrgbClr r="0" g="0" b="0"/>
+          </a:lnRef>
+          <a:fillRef idx="1">
+            <a:scrgbClr r="0" g="0" b="0"/>
+          </a:fillRef>
+          <a:effectRef idx="0">
+            <a:schemeClr val="accent1">
+              <a:hueOff val="0"/>
+              <a:satOff val="0"/>
+              <a:lumOff val="0"/>
+              <a:alphaOff val="0"/>
+            </a:schemeClr>
+          </a:effectRef>
+          <a:fontRef idx="minor">
+            <a:schemeClr val="lt1"/>
+          </a:fontRef>
+        </p:style>
+      </p:sp>
+      <p:sp>
+        <p:nvSpPr>
+          <p:cNvPr id="12" name="Text 1">
+            <a:extLst>
+              <a:ext uri="{FF2B5EF4-FFF2-40B4-BE49-F238E27FC236}">
+                <a16:creationId xmlns:a16="http://schemas.microsoft.com/office/drawing/2014/main" id="{6861A370-DF89-2405-4410-19F95D8C394C}"/>
+              </a:ext>
+            </a:extLst>
+          </p:cNvPr>
+          <p:cNvSpPr/>
+          <p:nvPr/>
+        </p:nvSpPr>
+        <p:spPr>
+          <a:xfrm>
+            <a:off x="3515592" y="3639728"/>
+            <a:ext cx="2286000" cy="1166813"/>
+          </a:xfrm>
+          <a:prstGeom prst="rect">
+            <a:avLst/>
+          </a:prstGeom>
+          <a:noFill/>
+          <a:ln/>
+        </p:spPr>
+        <p:txBody>
+          <a:bodyPr wrap="square" rtlCol="0" anchor="b"/>
+          <a:lstStyle/>
+          <a:p>
+            <a:pPr algn="ctr">
+              <a:lnSpc>
+                <a:spcPts val="1800"/>
+              </a:lnSpc>
+            </a:pPr>
+            <a:r>
+              <a:rPr lang="en-US" sz="1100" b="0" dirty="0">
                 <a:solidFill>
                   <a:srgbClr val="383838"/>
                 </a:solidFill>
@@ -11570,9 +11766,9 @@
                 <a:ea typeface="Noto Sans SC" pitchFamily="34" charset="-122"/>
                 <a:cs typeface="Noto Sans SC" pitchFamily="34" charset="-120"/>
               </a:rPr>
-              <a:t>Future Development Directions</a:t>
+              <a:t>Things to improve</a:t>
             </a:r>
-            <a:endParaRPr lang="en-US" dirty="0"/>
+            <a:endParaRPr lang="en-US" sz="1100" dirty="0"/>
           </a:p>
         </p:txBody>
       </p:sp>

</xml_diff>

<commit_message>
Final touch on report; Add name to code; Minor update on PPT
</commit_message>
<xml_diff>
--- a/CS_5002_FinalProject_Slides_QiuyingZhou_ZhiweiZhou.pptx
+++ b/CS_5002_FinalProject_Slides_QiuyingZhou_ZhiweiZhou.pptx
@@ -1961,7 +1961,7 @@
               </a:solidFill>
               <a:latin typeface=""/>
             </a:rPr>
-            <a:t>Step 1: Process input data</a:t>
+            <a:t>Step 1: Process input data (CSV)</a:t>
           </a:r>
           <a:endParaRPr lang="en-US" sz="1400" dirty="0">
             <a:solidFill>
@@ -2018,7 +2018,31 @@
               </a:solidFill>
               <a:latin typeface=""/>
             </a:rPr>
-            <a:t>Step 2: Represent the graph using </a:t>
+            <a:t>Step 2: Represent the Directed </a:t>
+          </a:r>
+          <a:r>
+            <a:rPr lang="en-US" sz="1400" b="0" dirty="0" err="1">
+              <a:solidFill>
+                <a:schemeClr val="tx1">
+                  <a:lumMod val="65000"/>
+                  <a:lumOff val="35000"/>
+                </a:schemeClr>
+              </a:solidFill>
+              <a:latin typeface=""/>
+            </a:rPr>
+            <a:t>Acyclical</a:t>
+          </a:r>
+          <a:r>
+            <a:rPr lang="en-US" sz="1400" b="0" dirty="0">
+              <a:solidFill>
+                <a:schemeClr val="tx1">
+                  <a:lumMod val="65000"/>
+                  <a:lumOff val="35000"/>
+                </a:schemeClr>
+              </a:solidFill>
+              <a:latin typeface=""/>
+            </a:rPr>
+            <a:t> Graph using </a:t>
           </a:r>
           <a:r>
             <a:rPr lang="en-US" sz="1400" b="1" dirty="0" err="1">
@@ -3381,7 +3405,7 @@
               </a:solidFill>
               <a:latin typeface=""/>
             </a:rPr>
-            <a:t>Step 1: Process input data</a:t>
+            <a:t>Step 1: Process input data (CSV)</a:t>
           </a:r>
           <a:endParaRPr lang="en-US" sz="1400" kern="1200" dirty="0">
             <a:solidFill>
@@ -3550,7 +3574,31 @@
               </a:solidFill>
               <a:latin typeface=""/>
             </a:rPr>
-            <a:t>Step 2: Represent the graph using </a:t>
+            <a:t>Step 2: Represent the Directed </a:t>
+          </a:r>
+          <a:r>
+            <a:rPr lang="en-US" sz="1400" b="0" kern="1200" dirty="0" err="1">
+              <a:solidFill>
+                <a:schemeClr val="tx1">
+                  <a:lumMod val="65000"/>
+                  <a:lumOff val="35000"/>
+                </a:schemeClr>
+              </a:solidFill>
+              <a:latin typeface=""/>
+            </a:rPr>
+            <a:t>Acyclical</a:t>
+          </a:r>
+          <a:r>
+            <a:rPr lang="en-US" sz="1400" b="0" kern="1200" dirty="0">
+              <a:solidFill>
+                <a:schemeClr val="tx1">
+                  <a:lumMod val="65000"/>
+                  <a:lumOff val="35000"/>
+                </a:schemeClr>
+              </a:solidFill>
+              <a:latin typeface=""/>
+            </a:rPr>
+            <a:t> Graph using </a:t>
           </a:r>
           <a:r>
             <a:rPr lang="en-US" sz="1400" b="1" kern="1200" dirty="0" err="1">
@@ -14576,7 +14624,7 @@
         <p:spPr>
           <a:xfrm>
             <a:off x="4841577" y="3301899"/>
-            <a:ext cx="1424067" cy="1454052"/>
+            <a:ext cx="1423914" cy="1453896"/>
           </a:xfrm>
           <a:prstGeom prst="rect">
             <a:avLst/>
@@ -20819,7 +20867,7 @@
           <p:nvPr>
             <p:extLst>
               <p:ext uri="{D42A27DB-BD31-4B8C-83A1-F6EECF244321}">
-                <p14:modId xmlns:p14="http://schemas.microsoft.com/office/powerpoint/2010/main" val="2688329584"/>
+                <p14:modId xmlns:p14="http://schemas.microsoft.com/office/powerpoint/2010/main" val="1360238170"/>
               </p:ext>
             </p:extLst>
           </p:nvPr>

</xml_diff>